<commit_message>
Updates / Changes after review
</commit_message>
<xml_diff>
--- a/docs/scrum/sprint0/Sprint 0 Planning.pptx
+++ b/docs/scrum/sprint0/Sprint 0 Planning.pptx
@@ -115,7 +115,7 @@
   </p:defaultTextStyle>
   <p:extLst>
     <p:ext uri="{EFAFB233-063F-42B5-8137-9DF3F51BA10A}">
-      <p15:sldGuideLst xmlns:p15="http://schemas.microsoft.com/office/powerpoint/2012/main">
+      <p15:sldGuideLst xmlns:p15="http://schemas.microsoft.com/office/powerpoint/2012/main" xmlns="">
         <p15:guide id="1" orient="horz" pos="3840">
           <p15:clr>
             <a:srgbClr val="A4A3A4"/>
@@ -215,7 +215,7 @@
             <a:fld id="{93F31936-34FB-46D7-8B5B-9A9CF58989DC}" type="datetimeFigureOut">
               <a:rPr lang="en-US" smtClean="0"/>
               <a:pPr/>
-              <a:t>6/22/2015</a:t>
+              <a:t>6/24/15</a:t>
             </a:fld>
             <a:endParaRPr lang="en-US"/>
           </a:p>
@@ -1506,7 +1506,7 @@
             <a:fld id="{31CC4B11-A6A5-4D9E-9368-043FB2A4AF23}" type="datetimeFigureOut">
               <a:rPr lang="en-US" smtClean="0"/>
               <a:pPr/>
-              <a:t>6/22/2015</a:t>
+              <a:t>6/24/15</a:t>
             </a:fld>
             <a:endParaRPr lang="en-US"/>
           </a:p>
@@ -1673,7 +1673,7 @@
             <a:fld id="{31CC4B11-A6A5-4D9E-9368-043FB2A4AF23}" type="datetimeFigureOut">
               <a:rPr lang="en-US" smtClean="0"/>
               <a:pPr/>
-              <a:t>6/22/2015</a:t>
+              <a:t>6/24/15</a:t>
             </a:fld>
             <a:endParaRPr lang="en-US"/>
           </a:p>
@@ -1850,7 +1850,7 @@
             <a:fld id="{31CC4B11-A6A5-4D9E-9368-043FB2A4AF23}" type="datetimeFigureOut">
               <a:rPr lang="en-US" smtClean="0"/>
               <a:pPr/>
-              <a:t>6/22/2015</a:t>
+              <a:t>6/24/15</a:t>
             </a:fld>
             <a:endParaRPr lang="en-US"/>
           </a:p>
@@ -2017,7 +2017,7 @@
             <a:fld id="{31CC4B11-A6A5-4D9E-9368-043FB2A4AF23}" type="datetimeFigureOut">
               <a:rPr lang="en-US" smtClean="0"/>
               <a:pPr/>
-              <a:t>6/22/2015</a:t>
+              <a:t>6/24/15</a:t>
             </a:fld>
             <a:endParaRPr lang="en-US"/>
           </a:p>
@@ -2260,7 +2260,7 @@
             <a:fld id="{31CC4B11-A6A5-4D9E-9368-043FB2A4AF23}" type="datetimeFigureOut">
               <a:rPr lang="en-US" smtClean="0"/>
               <a:pPr/>
-              <a:t>6/22/2015</a:t>
+              <a:t>6/24/15</a:t>
             </a:fld>
             <a:endParaRPr lang="en-US"/>
           </a:p>
@@ -2545,7 +2545,7 @@
             <a:fld id="{31CC4B11-A6A5-4D9E-9368-043FB2A4AF23}" type="datetimeFigureOut">
               <a:rPr lang="en-US" smtClean="0"/>
               <a:pPr/>
-              <a:t>6/22/2015</a:t>
+              <a:t>6/24/15</a:t>
             </a:fld>
             <a:endParaRPr lang="en-US"/>
           </a:p>
@@ -2964,7 +2964,7 @@
             <a:fld id="{31CC4B11-A6A5-4D9E-9368-043FB2A4AF23}" type="datetimeFigureOut">
               <a:rPr lang="en-US" smtClean="0"/>
               <a:pPr/>
-              <a:t>6/22/2015</a:t>
+              <a:t>6/24/15</a:t>
             </a:fld>
             <a:endParaRPr lang="en-US"/>
           </a:p>
@@ -3079,7 +3079,7 @@
             <a:fld id="{31CC4B11-A6A5-4D9E-9368-043FB2A4AF23}" type="datetimeFigureOut">
               <a:rPr lang="en-US" smtClean="0"/>
               <a:pPr/>
-              <a:t>6/22/2015</a:t>
+              <a:t>6/24/15</a:t>
             </a:fld>
             <a:endParaRPr lang="en-US"/>
           </a:p>
@@ -3171,7 +3171,7 @@
             <a:fld id="{31CC4B11-A6A5-4D9E-9368-043FB2A4AF23}" type="datetimeFigureOut">
               <a:rPr lang="en-US" smtClean="0"/>
               <a:pPr/>
-              <a:t>6/22/2015</a:t>
+              <a:t>6/24/15</a:t>
             </a:fld>
             <a:endParaRPr lang="en-US"/>
           </a:p>
@@ -3445,7 +3445,7 @@
             <a:fld id="{31CC4B11-A6A5-4D9E-9368-043FB2A4AF23}" type="datetimeFigureOut">
               <a:rPr lang="en-US" smtClean="0"/>
               <a:pPr/>
-              <a:t>6/22/2015</a:t>
+              <a:t>6/24/15</a:t>
             </a:fld>
             <a:endParaRPr lang="en-US"/>
           </a:p>
@@ -3699,7 +3699,7 @@
             <a:fld id="{31CC4B11-A6A5-4D9E-9368-043FB2A4AF23}" type="datetimeFigureOut">
               <a:rPr lang="en-US" smtClean="0"/>
               <a:pPr/>
-              <a:t>6/22/2015</a:t>
+              <a:t>6/24/15</a:t>
             </a:fld>
             <a:endParaRPr lang="en-US"/>
           </a:p>
@@ -3923,7 +3923,7 @@
             <a:fld id="{31CC4B11-A6A5-4D9E-9368-043FB2A4AF23}" type="datetimeFigureOut">
               <a:rPr lang="en-US" smtClean="0"/>
               <a:pPr/>
-              <a:t>6/22/2015</a:t>
+              <a:t>6/24/15</a:t>
             </a:fld>
             <a:endParaRPr lang="en-US"/>
           </a:p>
@@ -4852,7 +4852,7 @@
   <p:timing>
     <p:tnLst>
       <p:par>
-        <p:cTn id="1" dur="indefinite" restart="never" nodeType="tmRoot"/>
+        <p:cTn xmlns:p14="http://schemas.microsoft.com/office/powerpoint/2010/main" id="1" dur="indefinite" restart="never" nodeType="tmRoot"/>
       </p:par>
     </p:tnLst>
   </p:timing>
@@ -5020,7 +5020,7 @@
   <p:timing>
     <p:tnLst>
       <p:par>
-        <p:cTn id="1" dur="indefinite" restart="never" nodeType="tmRoot"/>
+        <p:cTn xmlns:p14="http://schemas.microsoft.com/office/powerpoint/2010/main" id="1" dur="indefinite" restart="never" nodeType="tmRoot"/>
       </p:par>
     </p:tnLst>
   </p:timing>
@@ -5145,14 +5145,14 @@
           </a:ln>
           <a:effectLst/>
           <a:extLst>
-            <a:ext uri="{909E8E84-426E-40DD-AFC4-6F175D3DCCD1}">
+            <a:ext uri="{909E8E84-426E-40dd-AFC4-6F175D3DCCD1}">
               <a14:hiddenFill xmlns:a14="http://schemas.microsoft.com/office/drawing/2010/main">
                 <a:solidFill>
                   <a:schemeClr val="accent1"/>
                 </a:solidFill>
               </a14:hiddenFill>
             </a:ext>
-            <a:ext uri="{91240B29-F687-4F45-9708-019B960494DF}">
+            <a:ext uri="{91240B29-F687-4f45-9708-019B960494DF}">
               <a14:hiddenLine xmlns:a14="http://schemas.microsoft.com/office/drawing/2010/main" w="9525">
                 <a:solidFill>
                   <a:schemeClr val="tx1"/>
@@ -5162,7 +5162,7 @@
                 <a:tailEnd/>
               </a14:hiddenLine>
             </a:ext>
-            <a:ext uri="{AF507438-7753-43E0-B8FC-AC1667EBCBE1}">
+            <a:ext uri="{AF507438-7753-43e0-B8FC-AC1667EBCBE1}">
               <a14:hiddenEffects xmlns:a14="http://schemas.microsoft.com/office/drawing/2010/main">
                 <a:effectLst>
                   <a:outerShdw dist="35921" dir="2700000" algn="ctr" rotWithShape="0">
@@ -5678,7 +5678,7 @@
   <p:timing>
     <p:tnLst>
       <p:par>
-        <p:cTn id="1" dur="indefinite" restart="never" nodeType="tmRoot"/>
+        <p:cTn xmlns:p14="http://schemas.microsoft.com/office/powerpoint/2010/main" id="1" dur="indefinite" restart="never" nodeType="tmRoot"/>
       </p:par>
     </p:tnLst>
   </p:timing>
@@ -5750,7 +5750,7 @@
         </p:spPr>
         <p:txBody>
           <a:bodyPr vert="horz" lIns="91440" tIns="45720" rIns="91440" bIns="45720" rtlCol="0" anchor="ctr">
-            <a:normAutofit/>
+            <a:normAutofit fontScale="92500"/>
           </a:bodyPr>
           <a:lstStyle>
             <a:lvl1pPr algn="ctr" defTabSz="914400" rtl="0" eaLnBrk="1" latinLnBrk="0" hangingPunct="1">
@@ -5776,8 +5776,29 @@
                   <a:schemeClr val="bg1"/>
                 </a:solidFill>
               </a:rPr>
-              <a:t>Sprint 0: Capture Sprint</a:t>
-            </a:r>
+              <a:t>Sprint 0: Capture </a:t>
+            </a:r>
+            <a:r>
+              <a:rPr lang="en-US" b="1" dirty="0" smtClean="0">
+                <a:solidFill>
+                  <a:schemeClr val="bg1"/>
+                </a:solidFill>
+              </a:rPr>
+              <a:t>Sprint </a:t>
+            </a:r>
+            <a:r>
+              <a:rPr lang="en-US" b="1" smtClean="0">
+                <a:solidFill>
+                  <a:schemeClr val="bg1"/>
+                </a:solidFill>
+              </a:rPr>
+              <a:t>- Discussion</a:t>
+            </a:r>
+            <a:endParaRPr lang="en-US" b="1" dirty="0" smtClean="0">
+              <a:solidFill>
+                <a:schemeClr val="bg1"/>
+              </a:solidFill>
+            </a:endParaRPr>
           </a:p>
         </p:txBody>
       </p:sp>
@@ -5803,14 +5824,14 @@
           </a:ln>
           <a:effectLst/>
           <a:extLst>
-            <a:ext uri="{909E8E84-426E-40DD-AFC4-6F175D3DCCD1}">
+            <a:ext uri="{909E8E84-426E-40dd-AFC4-6F175D3DCCD1}">
               <a14:hiddenFill xmlns:a14="http://schemas.microsoft.com/office/drawing/2010/main">
                 <a:solidFill>
                   <a:schemeClr val="accent1"/>
                 </a:solidFill>
               </a14:hiddenFill>
             </a:ext>
-            <a:ext uri="{91240B29-F687-4F45-9708-019B960494DF}">
+            <a:ext uri="{91240B29-F687-4f45-9708-019B960494DF}">
               <a14:hiddenLine xmlns:a14="http://schemas.microsoft.com/office/drawing/2010/main" w="9525">
                 <a:solidFill>
                   <a:schemeClr val="tx1"/>
@@ -5820,7 +5841,7 @@
                 <a:tailEnd/>
               </a14:hiddenLine>
             </a:ext>
-            <a:ext uri="{AF507438-7753-43E0-B8FC-AC1667EBCBE1}">
+            <a:ext uri="{AF507438-7753-43e0-B8FC-AC1667EBCBE1}">
               <a14:hiddenEffects xmlns:a14="http://schemas.microsoft.com/office/drawing/2010/main">
                 <a:effectLst>
                   <a:outerShdw dist="35921" dir="2700000" algn="ctr" rotWithShape="0">
@@ -6140,7 +6161,7 @@
   <p:timing>
     <p:tnLst>
       <p:par>
-        <p:cTn id="1" dur="indefinite" restart="never" nodeType="tmRoot"/>
+        <p:cTn xmlns:p14="http://schemas.microsoft.com/office/powerpoint/2010/main" id="1" dur="indefinite" restart="never" nodeType="tmRoot"/>
       </p:par>
     </p:tnLst>
   </p:timing>
@@ -6732,7 +6753,7 @@
   <p:timing>
     <p:tnLst>
       <p:par>
-        <p:cTn id="1" dur="indefinite" restart="never" nodeType="tmRoot"/>
+        <p:cTn xmlns:p14="http://schemas.microsoft.com/office/powerpoint/2010/main" id="1" dur="indefinite" restart="never" nodeType="tmRoot"/>
       </p:par>
     </p:tnLst>
   </p:timing>
@@ -6869,14 +6890,14 @@
             <a:noFill/>
           </a:ln>
           <a:extLst>
-            <a:ext uri="{909E8E84-426E-40DD-AFC4-6F175D3DCCD1}">
+            <a:ext uri="{909E8E84-426E-40dd-AFC4-6F175D3DCCD1}">
               <a14:hiddenFill xmlns:a14="http://schemas.microsoft.com/office/drawing/2010/main">
                 <a:solidFill>
                   <a:srgbClr val="FFFFFF"/>
                 </a:solidFill>
               </a14:hiddenFill>
             </a:ext>
-            <a:ext uri="{91240B29-F687-4F45-9708-019B960494DF}">
+            <a:ext uri="{91240B29-F687-4f45-9708-019B960494DF}">
               <a14:hiddenLine xmlns:a14="http://schemas.microsoft.com/office/drawing/2010/main" w="9525">
                 <a:solidFill>
                   <a:srgbClr val="000000"/>
@@ -6902,7 +6923,7 @@
   <p:timing>
     <p:tnLst>
       <p:par>
-        <p:cTn id="1" dur="indefinite" restart="never" nodeType="tmRoot"/>
+        <p:cTn xmlns:p14="http://schemas.microsoft.com/office/powerpoint/2010/main" id="1" dur="indefinite" restart="never" nodeType="tmRoot"/>
       </p:par>
     </p:tnLst>
   </p:timing>
@@ -6974,7 +6995,7 @@
   <p:timing>
     <p:tnLst>
       <p:par>
-        <p:cTn id="1" dur="indefinite" restart="never" nodeType="tmRoot"/>
+        <p:cTn xmlns:p14="http://schemas.microsoft.com/office/powerpoint/2010/main" id="1" dur="indefinite" restart="never" nodeType="tmRoot"/>
       </p:par>
     </p:tnLst>
   </p:timing>

</xml_diff>